<commit_message>
Added a couple of exercises on Inheritance, plus minor updates of notes
Also added a presentation on Abstract Factory design pattern.
</commit_message>
<xml_diff>
--- a/CSharpProgramming/Presentations/OOProgPartII/InheritanceFundamentals.pptx
+++ b/CSharpProgramming/Presentations/OOProgPartII/InheritanceFundamentals.pptx
@@ -262,7 +262,7 @@
           <a:p>
             <a:fld id="{E15B7D8E-2A20-4C0E-991C-872DBB7459A8}" type="datetimeFigureOut">
               <a:rPr lang="da-DK" smtClean="0"/>
-              <a:t>10-03-2018</a:t>
+              <a:t>04-04-2018</a:t>
             </a:fld>
             <a:endParaRPr lang="da-DK"/>
           </a:p>
@@ -432,7 +432,7 @@
           <a:p>
             <a:fld id="{E15B7D8E-2A20-4C0E-991C-872DBB7459A8}" type="datetimeFigureOut">
               <a:rPr lang="da-DK" smtClean="0"/>
-              <a:t>10-03-2018</a:t>
+              <a:t>04-04-2018</a:t>
             </a:fld>
             <a:endParaRPr lang="da-DK"/>
           </a:p>
@@ -612,7 +612,7 @@
           <a:p>
             <a:fld id="{E15B7D8E-2A20-4C0E-991C-872DBB7459A8}" type="datetimeFigureOut">
               <a:rPr lang="da-DK" smtClean="0"/>
-              <a:t>10-03-2018</a:t>
+              <a:t>04-04-2018</a:t>
             </a:fld>
             <a:endParaRPr lang="da-DK"/>
           </a:p>
@@ -782,7 +782,7 @@
           <a:p>
             <a:fld id="{E15B7D8E-2A20-4C0E-991C-872DBB7459A8}" type="datetimeFigureOut">
               <a:rPr lang="da-DK" smtClean="0"/>
-              <a:t>10-03-2018</a:t>
+              <a:t>04-04-2018</a:t>
             </a:fld>
             <a:endParaRPr lang="da-DK"/>
           </a:p>
@@ -1028,7 +1028,7 @@
           <a:p>
             <a:fld id="{E15B7D8E-2A20-4C0E-991C-872DBB7459A8}" type="datetimeFigureOut">
               <a:rPr lang="da-DK" smtClean="0"/>
-              <a:t>10-03-2018</a:t>
+              <a:t>04-04-2018</a:t>
             </a:fld>
             <a:endParaRPr lang="da-DK"/>
           </a:p>
@@ -1260,7 +1260,7 @@
           <a:p>
             <a:fld id="{E15B7D8E-2A20-4C0E-991C-872DBB7459A8}" type="datetimeFigureOut">
               <a:rPr lang="da-DK" smtClean="0"/>
-              <a:t>10-03-2018</a:t>
+              <a:t>04-04-2018</a:t>
             </a:fld>
             <a:endParaRPr lang="da-DK"/>
           </a:p>
@@ -1627,7 +1627,7 @@
           <a:p>
             <a:fld id="{E15B7D8E-2A20-4C0E-991C-872DBB7459A8}" type="datetimeFigureOut">
               <a:rPr lang="da-DK" smtClean="0"/>
-              <a:t>10-03-2018</a:t>
+              <a:t>04-04-2018</a:t>
             </a:fld>
             <a:endParaRPr lang="da-DK"/>
           </a:p>
@@ -1745,7 +1745,7 @@
           <a:p>
             <a:fld id="{E15B7D8E-2A20-4C0E-991C-872DBB7459A8}" type="datetimeFigureOut">
               <a:rPr lang="da-DK" smtClean="0"/>
-              <a:t>10-03-2018</a:t>
+              <a:t>04-04-2018</a:t>
             </a:fld>
             <a:endParaRPr lang="da-DK"/>
           </a:p>
@@ -1840,7 +1840,7 @@
           <a:p>
             <a:fld id="{E15B7D8E-2A20-4C0E-991C-872DBB7459A8}" type="datetimeFigureOut">
               <a:rPr lang="da-DK" smtClean="0"/>
-              <a:t>10-03-2018</a:t>
+              <a:t>04-04-2018</a:t>
             </a:fld>
             <a:endParaRPr lang="da-DK"/>
           </a:p>
@@ -2117,7 +2117,7 @@
           <a:p>
             <a:fld id="{E15B7D8E-2A20-4C0E-991C-872DBB7459A8}" type="datetimeFigureOut">
               <a:rPr lang="da-DK" smtClean="0"/>
-              <a:t>10-03-2018</a:t>
+              <a:t>04-04-2018</a:t>
             </a:fld>
             <a:endParaRPr lang="da-DK"/>
           </a:p>
@@ -2370,7 +2370,7 @@
           <a:p>
             <a:fld id="{E15B7D8E-2A20-4C0E-991C-872DBB7459A8}" type="datetimeFigureOut">
               <a:rPr lang="da-DK" smtClean="0"/>
-              <a:t>10-03-2018</a:t>
+              <a:t>04-04-2018</a:t>
             </a:fld>
             <a:endParaRPr lang="da-DK"/>
           </a:p>
@@ -2583,7 +2583,7 @@
           <a:p>
             <a:fld id="{E15B7D8E-2A20-4C0E-991C-872DBB7459A8}" type="datetimeFigureOut">
               <a:rPr lang="da-DK" smtClean="0"/>
-              <a:t>10-03-2018</a:t>
+              <a:t>04-04-2018</a:t>
             </a:fld>
             <a:endParaRPr lang="da-DK"/>
           </a:p>
@@ -3091,7 +3091,7 @@
                 </a:solidFill>
                 <a:latin typeface="Consolas" panose="020B0609020204030204" pitchFamily="49" charset="0"/>
               </a:rPr>
-              <a:t>class</a:t>
+              <a:t>public class</a:t>
             </a:r>
             <a:r>
               <a:rPr lang="en-US" sz="3600" b="1" smtClean="0">
@@ -3247,13 +3247,13 @@
           <a:lstStyle/>
           <a:p>
             <a:r>
-              <a:rPr lang="en-US" sz="3600" b="1" smtClean="0">
+              <a:rPr lang="en-US" sz="3600" b="1">
                 <a:solidFill>
                   <a:srgbClr val="0070C0"/>
                 </a:solidFill>
                 <a:latin typeface="Consolas" panose="020B0609020204030204" pitchFamily="49" charset="0"/>
               </a:rPr>
-              <a:t>class</a:t>
+              <a:t>public class</a:t>
             </a:r>
             <a:r>
               <a:rPr lang="en-US" sz="3600" b="1" smtClean="0">
@@ -3426,13 +3426,13 @@
           <a:lstStyle/>
           <a:p>
             <a:r>
-              <a:rPr lang="en-US" sz="3600" b="1" smtClean="0">
+              <a:rPr lang="en-US" sz="3600" b="1">
                 <a:solidFill>
                   <a:srgbClr val="0070C0"/>
                 </a:solidFill>
                 <a:latin typeface="Consolas" panose="020B0609020204030204" pitchFamily="49" charset="0"/>
               </a:rPr>
-              <a:t>class</a:t>
+              <a:t>public class</a:t>
             </a:r>
             <a:r>
               <a:rPr lang="en-US" sz="3600" b="1" smtClean="0">
@@ -5976,7 +5976,7 @@
         <p:spPr>
           <a:xfrm>
             <a:off x="1672390" y="1012924"/>
-            <a:ext cx="5961158" cy="4247317"/>
+            <a:ext cx="5961158" cy="4370427"/>
           </a:xfrm>
           <a:prstGeom prst="rect">
             <a:avLst/>
@@ -5990,13 +5990,13 @@
           <a:lstStyle/>
           <a:p>
             <a:r>
-              <a:rPr lang="en-US" sz="2800" b="1" smtClean="0">
+              <a:rPr lang="en-US" sz="2800" b="1">
                 <a:solidFill>
                   <a:srgbClr val="0070C0"/>
                 </a:solidFill>
                 <a:latin typeface="Consolas" panose="020B0609020204030204" pitchFamily="49" charset="0"/>
               </a:rPr>
-              <a:t>class</a:t>
+              <a:t>public class</a:t>
             </a:r>
             <a:r>
               <a:rPr lang="en-US" sz="2800" b="1" smtClean="0">
@@ -6396,7 +6396,7 @@
         <p:spPr>
           <a:xfrm>
             <a:off x="1672390" y="1012924"/>
-            <a:ext cx="9402010" cy="4678204"/>
+            <a:ext cx="9402010" cy="4801314"/>
           </a:xfrm>
           <a:prstGeom prst="rect">
             <a:avLst/>
@@ -6410,13 +6410,13 @@
           <a:lstStyle/>
           <a:p>
             <a:r>
-              <a:rPr lang="en-US" sz="2800" b="1" smtClean="0">
+              <a:rPr lang="en-US" sz="2800" b="1">
                 <a:solidFill>
                   <a:srgbClr val="0070C0"/>
                 </a:solidFill>
                 <a:latin typeface="Consolas" panose="020B0609020204030204" pitchFamily="49" charset="0"/>
               </a:rPr>
-              <a:t>class</a:t>
+              <a:t>public class</a:t>
             </a:r>
             <a:r>
               <a:rPr lang="en-US" sz="2800" b="1" smtClean="0">

</xml_diff>